<commit_message>
add all chapters for VB
</commit_message>
<xml_diff>
--- a/visual basic/L3 OBJECT PROPERTIES and METHODS.pptx
+++ b/visual basic/L3 OBJECT PROPERTIES and METHODS.pptx
@@ -219,7 +219,7 @@
           <a:p>
             <a:fld id="{75124139-BA33-9F4C-B908-4FDD8BB8A18B}" type="datetimeFigureOut">
               <a:rPr lang="en-US" smtClean="0"/>
-              <a:t>2/23/2021</a:t>
+              <a:t>3/3/2021</a:t>
             </a:fld>
             <a:endParaRPr lang="en-US"/>
           </a:p>
@@ -2531,7 +2531,7 @@
           <a:p>
             <a:fld id="{D19AAE9D-61D7-A845-B687-5F14A6752CE6}" type="datetimeFigureOut">
               <a:rPr lang="en-US" smtClean="0"/>
-              <a:t>2/23/2021</a:t>
+              <a:t>3/3/2021</a:t>
             </a:fld>
             <a:endParaRPr lang="en-US"/>
           </a:p>
@@ -2865,7 +2865,7 @@
           <a:p>
             <a:fld id="{D19AAE9D-61D7-A845-B687-5F14A6752CE6}" type="datetimeFigureOut">
               <a:rPr lang="en-US" smtClean="0"/>
-              <a:t>2/23/2021</a:t>
+              <a:t>3/3/2021</a:t>
             </a:fld>
             <a:endParaRPr lang="en-US"/>
           </a:p>
@@ -3143,7 +3143,7 @@
           <a:p>
             <a:fld id="{D19AAE9D-61D7-A845-B687-5F14A6752CE6}" type="datetimeFigureOut">
               <a:rPr lang="en-US" smtClean="0"/>
-              <a:t>2/23/2021</a:t>
+              <a:t>3/3/2021</a:t>
             </a:fld>
             <a:endParaRPr lang="en-US"/>
           </a:p>
@@ -3711,7 +3711,7 @@
           <a:p>
             <a:fld id="{D19AAE9D-61D7-A845-B687-5F14A6752CE6}" type="datetimeFigureOut">
               <a:rPr lang="en-US" smtClean="0"/>
-              <a:t>2/23/2021</a:t>
+              <a:t>3/3/2021</a:t>
             </a:fld>
             <a:endParaRPr lang="en-US"/>
           </a:p>
@@ -3989,7 +3989,7 @@
           <a:p>
             <a:fld id="{D19AAE9D-61D7-A845-B687-5F14A6752CE6}" type="datetimeFigureOut">
               <a:rPr lang="en-US" smtClean="0"/>
-              <a:t>2/23/2021</a:t>
+              <a:t>3/3/2021</a:t>
             </a:fld>
             <a:endParaRPr lang="en-US"/>
           </a:p>
@@ -4551,7 +4551,7 @@
           <a:p>
             <a:fld id="{D19AAE9D-61D7-A845-B687-5F14A6752CE6}" type="datetimeFigureOut">
               <a:rPr lang="en-US" smtClean="0"/>
-              <a:t>2/23/2021</a:t>
+              <a:t>3/3/2021</a:t>
             </a:fld>
             <a:endParaRPr lang="en-US"/>
           </a:p>
@@ -4878,7 +4878,7 @@
           <a:p>
             <a:fld id="{D19AAE9D-61D7-A845-B687-5F14A6752CE6}" type="datetimeFigureOut">
               <a:rPr lang="en-US" smtClean="0"/>
-              <a:t>2/23/2021</a:t>
+              <a:t>3/3/2021</a:t>
             </a:fld>
             <a:endParaRPr lang="en-US"/>
           </a:p>
@@ -5055,7 +5055,7 @@
           <a:p>
             <a:fld id="{D19AAE9D-61D7-A845-B687-5F14A6752CE6}" type="datetimeFigureOut">
               <a:rPr lang="en-US" smtClean="0"/>
-              <a:t>2/23/2021</a:t>
+              <a:t>3/3/2021</a:t>
             </a:fld>
             <a:endParaRPr lang="en-US"/>
           </a:p>
@@ -5293,7 +5293,7 @@
           <a:p>
             <a:fld id="{D19AAE9D-61D7-A845-B687-5F14A6752CE6}" type="datetimeFigureOut">
               <a:rPr lang="en-US" smtClean="0"/>
-              <a:t>2/23/2021</a:t>
+              <a:t>3/3/2021</a:t>
             </a:fld>
             <a:endParaRPr lang="en-US"/>
           </a:p>
@@ -5493,7 +5493,7 @@
           <a:p>
             <a:fld id="{D19AAE9D-61D7-A845-B687-5F14A6752CE6}" type="datetimeFigureOut">
               <a:rPr lang="en-US" smtClean="0"/>
-              <a:t>2/23/2021</a:t>
+              <a:t>3/3/2021</a:t>
             </a:fld>
             <a:endParaRPr lang="en-US"/>
           </a:p>
@@ -5769,7 +5769,7 @@
           <a:p>
             <a:fld id="{D19AAE9D-61D7-A845-B687-5F14A6752CE6}" type="datetimeFigureOut">
               <a:rPr lang="en-US" smtClean="0"/>
-              <a:t>2/23/2021</a:t>
+              <a:t>3/3/2021</a:t>
             </a:fld>
             <a:endParaRPr lang="en-US"/>
           </a:p>
@@ -6035,7 +6035,7 @@
           <a:p>
             <a:fld id="{D19AAE9D-61D7-A845-B687-5F14A6752CE6}" type="datetimeFigureOut">
               <a:rPr lang="en-US" smtClean="0"/>
-              <a:t>2/23/2021</a:t>
+              <a:t>3/3/2021</a:t>
             </a:fld>
             <a:endParaRPr lang="en-US"/>
           </a:p>
@@ -6409,7 +6409,7 @@
           <a:p>
             <a:fld id="{D19AAE9D-61D7-A845-B687-5F14A6752CE6}" type="datetimeFigureOut">
               <a:rPr lang="en-US" smtClean="0"/>
-              <a:t>2/23/2021</a:t>
+              <a:t>3/3/2021</a:t>
             </a:fld>
             <a:endParaRPr lang="en-US"/>
           </a:p>
@@ -6557,7 +6557,7 @@
           <a:p>
             <a:fld id="{D19AAE9D-61D7-A845-B687-5F14A6752CE6}" type="datetimeFigureOut">
               <a:rPr lang="en-US" smtClean="0"/>
-              <a:t>2/23/2021</a:t>
+              <a:t>3/3/2021</a:t>
             </a:fld>
             <a:endParaRPr lang="en-US"/>
           </a:p>
@@ -6682,7 +6682,7 @@
           <a:p>
             <a:fld id="{D19AAE9D-61D7-A845-B687-5F14A6752CE6}" type="datetimeFigureOut">
               <a:rPr lang="en-US" smtClean="0"/>
-              <a:t>2/23/2021</a:t>
+              <a:t>3/3/2021</a:t>
             </a:fld>
             <a:endParaRPr lang="en-US"/>
           </a:p>
@@ -6967,7 +6967,7 @@
           <a:p>
             <a:fld id="{D19AAE9D-61D7-A845-B687-5F14A6752CE6}" type="datetimeFigureOut">
               <a:rPr lang="en-US" smtClean="0"/>
-              <a:t>2/23/2021</a:t>
+              <a:t>3/3/2021</a:t>
             </a:fld>
             <a:endParaRPr lang="en-US"/>
           </a:p>
@@ -7291,7 +7291,7 @@
           <a:p>
             <a:fld id="{D19AAE9D-61D7-A845-B687-5F14A6752CE6}" type="datetimeFigureOut">
               <a:rPr lang="en-US" smtClean="0"/>
-              <a:t>2/23/2021</a:t>
+              <a:t>3/3/2021</a:t>
             </a:fld>
             <a:endParaRPr lang="en-US"/>
           </a:p>
@@ -7505,7 +7505,7 @@
           <a:p>
             <a:fld id="{D19AAE9D-61D7-A845-B687-5F14A6752CE6}" type="datetimeFigureOut">
               <a:rPr lang="en-US" smtClean="0"/>
-              <a:t>2/23/2021</a:t>
+              <a:t>3/3/2021</a:t>
             </a:fld>
             <a:endParaRPr lang="en-US"/>
           </a:p>
@@ -8246,7 +8246,6 @@
               <a:rPr lang="en-SG" dirty="0"/>
               <a:t>) Handles Button1.Click</a:t>
             </a:r>
-            <a:endParaRPr lang="en-SG" dirty="0"/>
           </a:p>
           <a:p>
             <a:endParaRPr lang="en-US" dirty="0"/>
@@ -9636,7 +9635,6 @@
               <a:rPr lang="en-SG" dirty="0"/>
               <a:t>property</a:t>
             </a:r>
-            <a:endParaRPr lang="en-SG" dirty="0"/>
           </a:p>
         </p:txBody>
       </p:sp>
@@ -10422,7 +10420,6 @@
               <a:rPr lang="en-US" dirty="0"/>
               <a:t>FORM OBJECT</a:t>
             </a:r>
-            <a:endParaRPr lang="en-US" dirty="0"/>
           </a:p>
           <a:p>
             <a:pPr marL="342900" indent="-342900">
@@ -10480,7 +10477,6 @@
               <a:rPr lang="en-US" dirty="0"/>
               <a:t>STRING Concatenation in visual Basic</a:t>
             </a:r>
-            <a:endParaRPr lang="en-US" dirty="0"/>
           </a:p>
           <a:p>
             <a:pPr marL="342900" indent="-342900">
@@ -11598,11 +11594,7 @@
             </a:pPr>
             <a:r>
               <a:rPr lang="en-US" dirty="0" smtClean="0"/>
-              <a:t>Input name button on click must prin</a:t>
-            </a:r>
-            <a:r>
-              <a:rPr lang="en-US" dirty="0" smtClean="0"/>
-              <a:t>t in visual studio output</a:t>
+              <a:t>Input name button on click must print in visual studio output</a:t>
             </a:r>
           </a:p>
           <a:p>
@@ -14248,7 +14240,6 @@
               <a:rPr lang="en-US" dirty="0"/>
               <a:t>E.g. draw a red circle with diameter 100</a:t>
             </a:r>
-            <a:endParaRPr lang="en-US" dirty="0"/>
           </a:p>
         </p:txBody>
       </p:sp>
@@ -14425,7 +14416,7 @@
             <a:r>
               <a:rPr lang="en-SG" dirty="0" err="1">
                 <a:solidFill>
-                  <a:schemeClr val="accent6"/>
+                  <a:srgbClr val="FFFF00"/>
                 </a:solidFill>
               </a:rPr>
               <a:t>ellipse_pen</a:t>
@@ -14433,10 +14424,18 @@
             <a:r>
               <a:rPr lang="en-SG" dirty="0">
                 <a:solidFill>
+                  <a:srgbClr val="FFFF00"/>
+                </a:solidFill>
+              </a:rPr>
+              <a:t>, 0, 0, 200, 200</a:t>
+            </a:r>
+            <a:r>
+              <a:rPr lang="en-SG" dirty="0">
+                <a:solidFill>
                   <a:schemeClr val="accent6"/>
                 </a:solidFill>
               </a:rPr>
-              <a:t>, 0, 0, 200, 200)</a:t>
+              <a:t>)</a:t>
             </a:r>
           </a:p>
         </p:txBody>

</xml_diff>